<commit_message>
Updating template for proper layout dimensions for ppt
</commit_message>
<xml_diff>
--- a/inst/rmarkdown/templates/ppt_presentation/skeleton/moffitt_powerpoint_styles.pptx
+++ b/inst/rmarkdown/templates/ppt_presentation/skeleton/moffitt_powerpoint_styles.pptx
@@ -7,7 +7,7 @@
   <p:sldIdLst>
     <p:sldId id="256" r:id="rId2"/>
   </p:sldIdLst>
-  <p:sldSz cx="12192000" cy="6858000"/>
+  <p:sldSz cx="9144000" cy="6858000" type="screen4x3"/>
   <p:notesSz cx="6858000" cy="9144000"/>
   <p:defaultTextStyle>
     <a:defPPr>
@@ -150,8 +150,8 @@
         </p:nvSpPr>
         <p:spPr>
           <a:xfrm>
-            <a:off x="1524000" y="1122363"/>
-            <a:ext cx="9144000" cy="2387600"/>
+            <a:off x="1143000" y="1122363"/>
+            <a:ext cx="6858000" cy="2387600"/>
           </a:xfrm>
         </p:spPr>
         <p:txBody>
@@ -195,8 +195,8 @@
         </p:nvSpPr>
         <p:spPr>
           <a:xfrm>
-            <a:off x="1524000" y="3602038"/>
-            <a:ext cx="7213600" cy="1126270"/>
+            <a:off x="1143000" y="3602038"/>
+            <a:ext cx="5410200" cy="1126270"/>
           </a:xfrm>
         </p:spPr>
         <p:txBody>
@@ -280,7 +280,7 @@
             <a:fld id="{81C4D0F2-ACE4-C048-B567-AE18D037DC2E}" type="datetimeFigureOut">
               <a:rPr lang="en-US" smtClean="0"/>
               <a:pPr/>
-              <a:t>11/19/2018</a:t>
+              <a:t>11/21/2018</a:t>
             </a:fld>
             <a:endParaRPr lang="en-US" dirty="0"/>
           </a:p>
@@ -335,8 +335,8 @@
         </p:blipFill>
         <p:spPr>
           <a:xfrm>
-            <a:off x="9753602" y="6155428"/>
-            <a:ext cx="2259034" cy="560132"/>
+            <a:off x="7315201" y="6155428"/>
+            <a:ext cx="1694276" cy="560132"/>
           </a:xfrm>
           <a:prstGeom prst="rect">
             <a:avLst/>
@@ -430,8 +430,8 @@
         </p:nvSpPr>
         <p:spPr>
           <a:xfrm>
-            <a:off x="457200" y="1825625"/>
-            <a:ext cx="11320585" cy="4351338"/>
+            <a:off x="342900" y="1825625"/>
+            <a:ext cx="8490439" cy="4351338"/>
           </a:xfrm>
         </p:spPr>
         <p:txBody>
@@ -592,8 +592,8 @@
         </p:blipFill>
         <p:spPr>
           <a:xfrm>
-            <a:off x="10378832" y="0"/>
-            <a:ext cx="1808284" cy="1769706"/>
+            <a:off x="7784124" y="0"/>
+            <a:ext cx="1356213" cy="1769706"/>
           </a:xfrm>
           <a:prstGeom prst="rect">
             <a:avLst/>
@@ -609,7 +609,7 @@
         <p:spPr>
           <a:xfrm>
             <a:off x="0" y="1779945"/>
-            <a:ext cx="12192000" cy="0"/>
+            <a:ext cx="9144000" cy="0"/>
           </a:xfrm>
           <a:prstGeom prst="line">
             <a:avLst/>
@@ -658,8 +658,8 @@
         </p:blipFill>
         <p:spPr>
           <a:xfrm>
-            <a:off x="457200" y="6264032"/>
-            <a:ext cx="1518920" cy="376619"/>
+            <a:off x="342900" y="6264033"/>
+            <a:ext cx="1139190" cy="376619"/>
           </a:xfrm>
           <a:prstGeom prst="rect">
             <a:avLst/>
@@ -722,8 +722,8 @@
         </p:nvSpPr>
         <p:spPr>
           <a:xfrm>
-            <a:off x="545611" y="1779946"/>
-            <a:ext cx="11302511" cy="2782530"/>
+            <a:off x="409209" y="1779946"/>
+            <a:ext cx="8476883" cy="2782530"/>
           </a:xfrm>
         </p:spPr>
         <p:txBody>
@@ -758,8 +758,8 @@
         </p:nvSpPr>
         <p:spPr>
           <a:xfrm>
-            <a:off x="539262" y="4589463"/>
-            <a:ext cx="11308860" cy="1500187"/>
+            <a:off x="404446" y="4589464"/>
+            <a:ext cx="8481645" cy="1500187"/>
           </a:xfrm>
         </p:spPr>
         <p:txBody>
@@ -944,8 +944,8 @@
         </p:blipFill>
         <p:spPr>
           <a:xfrm>
-            <a:off x="10378832" y="0"/>
-            <a:ext cx="1808284" cy="1769706"/>
+            <a:off x="7784124" y="0"/>
+            <a:ext cx="1356213" cy="1769706"/>
           </a:xfrm>
           <a:prstGeom prst="rect">
             <a:avLst/>
@@ -961,7 +961,7 @@
         <p:spPr>
           <a:xfrm>
             <a:off x="0" y="1779945"/>
-            <a:ext cx="12192000" cy="0"/>
+            <a:ext cx="9144000" cy="0"/>
           </a:xfrm>
           <a:prstGeom prst="line">
             <a:avLst/>
@@ -1010,8 +1010,8 @@
         </p:blipFill>
         <p:spPr>
           <a:xfrm>
-            <a:off x="457200" y="6264032"/>
-            <a:ext cx="1518920" cy="376619"/>
+            <a:off x="342900" y="6264033"/>
+            <a:ext cx="1139190" cy="376619"/>
           </a:xfrm>
           <a:prstGeom prst="rect">
             <a:avLst/>
@@ -1105,8 +1105,8 @@
         </p:nvSpPr>
         <p:spPr>
           <a:xfrm>
-            <a:off x="457200" y="1825625"/>
-            <a:ext cx="5562600" cy="4351338"/>
+            <a:off x="342900" y="1825625"/>
+            <a:ext cx="4171950" cy="4351338"/>
           </a:xfrm>
         </p:spPr>
         <p:txBody>
@@ -1198,8 +1198,8 @@
         </p:nvSpPr>
         <p:spPr>
           <a:xfrm>
-            <a:off x="6172200" y="1825625"/>
-            <a:ext cx="5636846" cy="4351338"/>
+            <a:off x="4629150" y="1825625"/>
+            <a:ext cx="4227635" cy="4351338"/>
           </a:xfrm>
         </p:spPr>
         <p:txBody>
@@ -1347,7 +1347,7 @@
         <p:spPr>
           <a:xfrm>
             <a:off x="0" y="1779945"/>
-            <a:ext cx="12192000" cy="0"/>
+            <a:ext cx="9144000" cy="0"/>
           </a:xfrm>
           <a:prstGeom prst="line">
             <a:avLst/>
@@ -1396,8 +1396,8 @@
         </p:blipFill>
         <p:spPr>
           <a:xfrm>
-            <a:off x="10378832" y="0"/>
-            <a:ext cx="1808284" cy="1769706"/>
+            <a:off x="7784124" y="0"/>
+            <a:ext cx="1356213" cy="1769706"/>
           </a:xfrm>
           <a:prstGeom prst="rect">
             <a:avLst/>
@@ -1426,8 +1426,8 @@
         </p:blipFill>
         <p:spPr>
           <a:xfrm>
-            <a:off x="457200" y="6264032"/>
-            <a:ext cx="1518920" cy="376619"/>
+            <a:off x="342900" y="6264033"/>
+            <a:ext cx="1139190" cy="376619"/>
           </a:xfrm>
           <a:prstGeom prst="rect">
             <a:avLst/>
@@ -1484,8 +1484,8 @@
         </p:nvSpPr>
         <p:spPr>
           <a:xfrm>
-            <a:off x="838200" y="365125"/>
-            <a:ext cx="10515600" cy="1325563"/>
+            <a:off x="628650" y="365126"/>
+            <a:ext cx="7886700" cy="1325563"/>
           </a:xfrm>
           <a:prstGeom prst="rect">
             <a:avLst/>
@@ -1517,8 +1517,8 @@
         </p:nvSpPr>
         <p:spPr>
           <a:xfrm>
-            <a:off x="838200" y="1825625"/>
-            <a:ext cx="10515600" cy="4351338"/>
+            <a:off x="628650" y="1825625"/>
+            <a:ext cx="7886700" cy="4351338"/>
           </a:xfrm>
           <a:prstGeom prst="rect">
             <a:avLst/>
@@ -1578,8 +1578,8 @@
         </p:nvSpPr>
         <p:spPr>
           <a:xfrm>
-            <a:off x="838200" y="6356350"/>
-            <a:ext cx="2743200" cy="365125"/>
+            <a:off x="628650" y="6356351"/>
+            <a:ext cx="2057400" cy="365125"/>
           </a:xfrm>
           <a:prstGeom prst="rect">
             <a:avLst/>
@@ -1618,8 +1618,8 @@
         </p:nvSpPr>
         <p:spPr>
           <a:xfrm>
-            <a:off x="4038600" y="6356350"/>
-            <a:ext cx="4114800" cy="365125"/>
+            <a:off x="3028950" y="6356351"/>
+            <a:ext cx="3086100" cy="365125"/>
           </a:xfrm>
           <a:prstGeom prst="rect">
             <a:avLst/>
@@ -1653,8 +1653,8 @@
         </p:nvSpPr>
         <p:spPr>
           <a:xfrm>
-            <a:off x="8610600" y="6356350"/>
-            <a:ext cx="2743200" cy="365125"/>
+            <a:off x="6457950" y="6356351"/>
+            <a:ext cx="2057400" cy="365125"/>
           </a:xfrm>
           <a:prstGeom prst="rect">
             <a:avLst/>
@@ -1675,7 +1675,7 @@
             <a:fld id="{81C4D0F2-ACE4-C048-B567-AE18D037DC2E}" type="datetimeFigureOut">
               <a:rPr lang="en-US" smtClean="0"/>
               <a:pPr/>
-              <a:t>11/19/2018</a:t>
+              <a:t>11/21/2018</a:t>
             </a:fld>
             <a:endParaRPr lang="en-US" dirty="0"/>
           </a:p>
@@ -2000,7 +2000,7 @@
           <p:cNvPr id="2" name="Title 1">
             <a:extLst>
               <a:ext uri="{FF2B5EF4-FFF2-40B4-BE49-F238E27FC236}">
-                <a16:creationId xmlns:a16="http://schemas.microsoft.com/office/drawing/2014/main" xmlns="" id="{6471420B-793C-9541-AA4C-1744B4975666}"/>
+                <a16:creationId xmlns="" xmlns:a16="http://schemas.microsoft.com/office/drawing/2014/main" id="{6471420B-793C-9541-AA4C-1744B4975666}"/>
               </a:ext>
             </a:extLst>
           </p:cNvPr>
@@ -2025,7 +2025,7 @@
           <p:cNvPr id="3" name="Subtitle 2">
             <a:extLst>
               <a:ext uri="{FF2B5EF4-FFF2-40B4-BE49-F238E27FC236}">
-                <a16:creationId xmlns:a16="http://schemas.microsoft.com/office/drawing/2014/main" xmlns="" id="{2A2D689B-AFED-8C44-AB73-433F6FEC3147}"/>
+                <a16:creationId xmlns="" xmlns:a16="http://schemas.microsoft.com/office/drawing/2014/main" id="{2A2D689B-AFED-8C44-AB73-433F6FEC3147}"/>
               </a:ext>
             </a:extLst>
           </p:cNvPr>
@@ -2313,7 +2313,7 @@
   <a:extraClrSchemeLst/>
   <a:extLst>
     <a:ext uri="{05A4C25C-085E-4340-85A3-A5531E510DB2}">
-      <thm15:themeFamily xmlns:thm15="http://schemas.microsoft.com/office/thememl/2012/main" xmlns="" name="Presentation3" id="{1B38DA30-0CE3-AE48-AEC0-2FBA936BF5ED}" vid="{2CCE4DA5-2E16-5E44-97B1-2FDB7ECCCE6D}"/>
+      <thm15:themeFamily xmlns="" xmlns:thm15="http://schemas.microsoft.com/office/thememl/2012/main" name="Presentation3" id="{1B38DA30-0CE3-AE48-AEC0-2FBA936BF5ED}" vid="{2CCE4DA5-2E16-5E44-97B1-2FDB7ECCCE6D}"/>
     </a:ext>
   </a:extLst>
 </a:theme>

</xml_diff>